<commit_message>
Updated the presentation after peer reviewing
</commit_message>
<xml_diff>
--- a/Presentation.pptx
+++ b/Presentation.pptx
@@ -377,11 +377,11 @@
         </c:dLbls>
         <c:marker val="1"/>
         <c:smooth val="0"/>
-        <c:axId val="82951168"/>
-        <c:axId val="83021184"/>
+        <c:axId val="111356416"/>
+        <c:axId val="44337984"/>
       </c:lineChart>
       <c:catAx>
-        <c:axId val="82951168"/>
+        <c:axId val="111356416"/>
         <c:scaling>
           <c:orientation val="minMax"/>
         </c:scaling>
@@ -401,7 +401,7 @@
             <a:endParaRPr lang="pt-PT"/>
           </a:p>
         </c:txPr>
-        <c:crossAx val="83021184"/>
+        <c:crossAx val="44337984"/>
         <c:crosses val="autoZero"/>
         <c:auto val="1"/>
         <c:lblAlgn val="ctr"/>
@@ -409,7 +409,7 @@
         <c:noMultiLvlLbl val="0"/>
       </c:catAx>
       <c:valAx>
-        <c:axId val="83021184"/>
+        <c:axId val="44337984"/>
         <c:scaling>
           <c:orientation val="minMax"/>
         </c:scaling>
@@ -428,7 +428,7 @@
         <c:majorTickMark val="out"/>
         <c:minorTickMark val="none"/>
         <c:tickLblPos val="nextTo"/>
-        <c:crossAx val="82951168"/>
+        <c:crossAx val="111356416"/>
         <c:crosses val="autoZero"/>
         <c:crossBetween val="between"/>
       </c:valAx>
@@ -535,7 +535,7 @@
           <a:p>
             <a:fld id="{21EC9149-67E8-448A-8434-24835FD538DE}" type="datetimeFigureOut">
               <a:rPr lang="en-US" smtClean="0"/>
-              <a:t>10/26/2021</a:t>
+              <a:t>10/27/2021</a:t>
             </a:fld>
             <a:endParaRPr lang="en-US"/>
           </a:p>
@@ -1152,7 +1152,7 @@
           <a:p>
             <a:fld id="{6EE8D08E-F3AD-425B-B504-BB05E08BC299}" type="datetimeFigureOut">
               <a:rPr lang="en-US" smtClean="0"/>
-              <a:t>10/26/2021</a:t>
+              <a:t>10/27/2021</a:t>
             </a:fld>
             <a:endParaRPr lang="en-US"/>
           </a:p>
@@ -1322,7 +1322,7 @@
           <a:p>
             <a:fld id="{6EE8D08E-F3AD-425B-B504-BB05E08BC299}" type="datetimeFigureOut">
               <a:rPr lang="en-US" smtClean="0"/>
-              <a:t>10/26/2021</a:t>
+              <a:t>10/27/2021</a:t>
             </a:fld>
             <a:endParaRPr lang="en-US"/>
           </a:p>
@@ -1502,7 +1502,7 @@
           <a:p>
             <a:fld id="{6EE8D08E-F3AD-425B-B504-BB05E08BC299}" type="datetimeFigureOut">
               <a:rPr lang="en-US" smtClean="0"/>
-              <a:t>10/26/2021</a:t>
+              <a:t>10/27/2021</a:t>
             </a:fld>
             <a:endParaRPr lang="en-US"/>
           </a:p>
@@ -1672,7 +1672,7 @@
           <a:p>
             <a:fld id="{6EE8D08E-F3AD-425B-B504-BB05E08BC299}" type="datetimeFigureOut">
               <a:rPr lang="en-US" smtClean="0"/>
-              <a:t>10/26/2021</a:t>
+              <a:t>10/27/2021</a:t>
             </a:fld>
             <a:endParaRPr lang="en-US"/>
           </a:p>
@@ -1918,7 +1918,7 @@
           <a:p>
             <a:fld id="{6EE8D08E-F3AD-425B-B504-BB05E08BC299}" type="datetimeFigureOut">
               <a:rPr lang="en-US" smtClean="0"/>
-              <a:t>10/26/2021</a:t>
+              <a:t>10/27/2021</a:t>
             </a:fld>
             <a:endParaRPr lang="en-US"/>
           </a:p>
@@ -2206,7 +2206,7 @@
           <a:p>
             <a:fld id="{6EE8D08E-F3AD-425B-B504-BB05E08BC299}" type="datetimeFigureOut">
               <a:rPr lang="en-US" smtClean="0"/>
-              <a:t>10/26/2021</a:t>
+              <a:t>10/27/2021</a:t>
             </a:fld>
             <a:endParaRPr lang="en-US"/>
           </a:p>
@@ -2628,7 +2628,7 @@
           <a:p>
             <a:fld id="{6EE8D08E-F3AD-425B-B504-BB05E08BC299}" type="datetimeFigureOut">
               <a:rPr lang="en-US" smtClean="0"/>
-              <a:t>10/26/2021</a:t>
+              <a:t>10/27/2021</a:t>
             </a:fld>
             <a:endParaRPr lang="en-US"/>
           </a:p>
@@ -2746,7 +2746,7 @@
           <a:p>
             <a:fld id="{6EE8D08E-F3AD-425B-B504-BB05E08BC299}" type="datetimeFigureOut">
               <a:rPr lang="en-US" smtClean="0"/>
-              <a:t>10/26/2021</a:t>
+              <a:t>10/27/2021</a:t>
             </a:fld>
             <a:endParaRPr lang="en-US"/>
           </a:p>
@@ -2841,7 +2841,7 @@
           <a:p>
             <a:fld id="{6EE8D08E-F3AD-425B-B504-BB05E08BC299}" type="datetimeFigureOut">
               <a:rPr lang="en-US" smtClean="0"/>
-              <a:t>10/26/2021</a:t>
+              <a:t>10/27/2021</a:t>
             </a:fld>
             <a:endParaRPr lang="en-US"/>
           </a:p>
@@ -3118,7 +3118,7 @@
           <a:p>
             <a:fld id="{6EE8D08E-F3AD-425B-B504-BB05E08BC299}" type="datetimeFigureOut">
               <a:rPr lang="en-US" smtClean="0"/>
-              <a:t>10/26/2021</a:t>
+              <a:t>10/27/2021</a:t>
             </a:fld>
             <a:endParaRPr lang="en-US"/>
           </a:p>
@@ -3371,7 +3371,7 @@
           <a:p>
             <a:fld id="{6EE8D08E-F3AD-425B-B504-BB05E08BC299}" type="datetimeFigureOut">
               <a:rPr lang="en-US" smtClean="0"/>
-              <a:t>10/26/2021</a:t>
+              <a:t>10/27/2021</a:t>
             </a:fld>
             <a:endParaRPr lang="en-US"/>
           </a:p>
@@ -3584,7 +3584,7 @@
           <a:p>
             <a:fld id="{6EE8D08E-F3AD-425B-B504-BB05E08BC299}" type="datetimeFigureOut">
               <a:rPr lang="en-US" smtClean="0"/>
-              <a:t>10/26/2021</a:t>
+              <a:t>10/27/2021</a:t>
             </a:fld>
             <a:endParaRPr lang="en-US"/>
           </a:p>
@@ -5891,13 +5891,8 @@
           <a:p>
             <a:r>
               <a:rPr lang="en-US" dirty="0" smtClean="0"/>
-              <a:t>Very cheap, lets go over it</a:t>
-            </a:r>
-            <a:r>
-              <a:rPr lang="en-US" dirty="0" smtClean="0"/>
-              <a:t>!</a:t>
-            </a:r>
-            <a:endParaRPr lang="en-US" dirty="0" smtClean="0"/>
+              <a:t>Very cheap, lets go over it!</a:t>
+            </a:r>
           </a:p>
         </p:txBody>
       </p:sp>
@@ -13931,13 +13926,8 @@
           <a:p>
             <a:r>
               <a:rPr lang="en-US" dirty="0" smtClean="0"/>
-              <a:t>No VRAM, Framebuffer and whatnot must be stored in </a:t>
-            </a:r>
-            <a:r>
-              <a:rPr lang="en-US" dirty="0" smtClean="0"/>
-              <a:t>RAM.</a:t>
-            </a:r>
-            <a:endParaRPr lang="en-US" dirty="0" smtClean="0"/>
+              <a:t>No VRAM, Framebuffer and whatnot must be stored in RAM.</a:t>
+            </a:r>
           </a:p>
           <a:p>
             <a:r>
@@ -13976,11 +13966,7 @@
           <a:p>
             <a:r>
               <a:rPr lang="en-US" dirty="0" smtClean="0"/>
-              <a:t>16-Bit </a:t>
-            </a:r>
-            <a:r>
-              <a:rPr lang="en-US" dirty="0" smtClean="0"/>
-              <a:t>or 32-Bit</a:t>
+              <a:t>16-Bit or 32-Bit</a:t>
             </a:r>
           </a:p>
           <a:p>
@@ -13990,17 +13976,8 @@
             </a:pPr>
             <a:r>
               <a:rPr lang="en-US" dirty="0" smtClean="0"/>
-              <a:t>Gets </a:t>
-            </a:r>
-            <a:r>
-              <a:rPr lang="en-US" dirty="0" smtClean="0"/>
-              <a:t>outputted as 24-Bit </a:t>
-            </a:r>
-            <a:r>
-              <a:rPr lang="en-US" dirty="0" smtClean="0"/>
-              <a:t>color, so probably not worth the memory penalty going 32-Bit</a:t>
-            </a:r>
-            <a:endParaRPr lang="en-US" dirty="0" smtClean="0"/>
+              <a:t>Gets outputted as 24-Bit color, so probably not worth the memory penalty going 32-Bit</a:t>
+            </a:r>
           </a:p>
           <a:p>
             <a:r>
@@ -14167,11 +14144,7 @@
             </a:r>
             <a:r>
               <a:rPr lang="en-US" dirty="0" smtClean="0"/>
-              <a:t> has a built in </a:t>
-            </a:r>
-            <a:r>
-              <a:rPr lang="en-US" dirty="0" smtClean="0"/>
-              <a:t>filesystem.</a:t>
+              <a:t> has a built in filesystem.</a:t>
             </a:r>
             <a:endParaRPr lang="en-US" dirty="0"/>
           </a:p>
@@ -15203,11 +15176,7 @@
           <a:p>
             <a:r>
               <a:rPr lang="en-US" dirty="0" smtClean="0"/>
-              <a:t>Model </a:t>
-            </a:r>
-            <a:r>
-              <a:rPr lang="en-US" dirty="0" smtClean="0"/>
-              <a:t>Animation</a:t>
+              <a:t>Model Animation</a:t>
             </a:r>
             <a:endParaRPr lang="en-US" dirty="0"/>
           </a:p>
@@ -15237,13 +15206,8 @@
           <a:p>
             <a:r>
               <a:rPr lang="en-US" dirty="0" smtClean="0"/>
-              <a:t>Sausage </a:t>
-            </a:r>
-            <a:r>
-              <a:rPr lang="en-US" dirty="0" smtClean="0"/>
-              <a:t>links</a:t>
-            </a:r>
-            <a:endParaRPr lang="en-US" dirty="0" smtClean="0"/>
+              <a:t>Sausage links</a:t>
+            </a:r>
           </a:p>
           <a:p>
             <a:r>
@@ -15262,7 +15226,6 @@
               <a:rPr lang="en-US" dirty="0" smtClean="0"/>
               <a:t>animation frames</a:t>
             </a:r>
-            <a:endParaRPr lang="en-US" dirty="0" smtClean="0"/>
           </a:p>
           <a:p>
             <a:pPr lvl="1">
@@ -15281,22 +15244,13 @@
             </a:pPr>
             <a:r>
               <a:rPr lang="en-US" dirty="0" smtClean="0"/>
-              <a:t>Skeleton </a:t>
-            </a:r>
-            <a:r>
-              <a:rPr lang="en-US" dirty="0" smtClean="0"/>
-              <a:t>system</a:t>
-            </a:r>
-            <a:endParaRPr lang="en-US" dirty="0" smtClean="0"/>
-          </a:p>
-          <a:p>
-            <a:r>
-              <a:rPr lang="en-US" dirty="0" smtClean="0"/>
-              <a:t>Vertex </a:t>
-            </a:r>
-            <a:r>
-              <a:rPr lang="en-US" dirty="0" smtClean="0"/>
-              <a:t>cache hack</a:t>
+              <a:t>Skeleton system</a:t>
+            </a:r>
+          </a:p>
+          <a:p>
+            <a:r>
+              <a:rPr lang="en-US" dirty="0" smtClean="0"/>
+              <a:t>Vertex cache hack</a:t>
             </a:r>
             <a:endParaRPr lang="en-US" dirty="0"/>
           </a:p>
@@ -15392,15 +15346,7 @@
           <a:p>
             <a:r>
               <a:rPr lang="en-US" dirty="0" smtClean="0"/>
-              <a:t>You can just put whatever you want in </a:t>
-            </a:r>
-            <a:r>
-              <a:rPr lang="en-US" dirty="0" smtClean="0"/>
-              <a:t>an </a:t>
-            </a:r>
-            <a:r>
-              <a:rPr lang="en-US" dirty="0" smtClean="0"/>
-              <a:t>audio buffer</a:t>
+              <a:t>You can just put whatever you want in an audio buffer</a:t>
             </a:r>
           </a:p>
           <a:p>
@@ -15571,23 +15517,7 @@
             </a:pPr>
             <a:r>
               <a:rPr lang="en-US" dirty="0" smtClean="0"/>
-              <a:t>Only </a:t>
-            </a:r>
-            <a:r>
-              <a:rPr lang="en-US" dirty="0" smtClean="0"/>
-              <a:t>one commercial </a:t>
-            </a:r>
-            <a:r>
-              <a:rPr lang="en-US" dirty="0" smtClean="0"/>
-              <a:t>game runs at a near stable 60FPS (</a:t>
-            </a:r>
-            <a:r>
-              <a:rPr lang="en-US" dirty="0" smtClean="0"/>
-              <a:t>50FPS on PAL), </a:t>
-            </a:r>
-            <a:r>
-              <a:rPr lang="en-US" dirty="0" smtClean="0"/>
-              <a:t>everything else pretty much runs at 30 or lower.</a:t>
+              <a:t>Only one commercial game runs at a near stable 60FPS (50FPS on PAL), everything else pretty much runs at 30 or lower.</a:t>
             </a:r>
           </a:p>
           <a:p>
@@ -15617,11 +15547,7 @@
           <a:p>
             <a:r>
               <a:rPr lang="en-US" dirty="0" smtClean="0"/>
-              <a:t>Optimize your drawing order</a:t>
-            </a:r>
-            <a:r>
-              <a:rPr lang="en-US" dirty="0" smtClean="0"/>
-              <a:t>.</a:t>
+              <a:t>Optimize your drawing order.</a:t>
             </a:r>
           </a:p>
           <a:p>
@@ -15631,11 +15557,7 @@
             </a:pPr>
             <a:r>
               <a:rPr lang="en-US" dirty="0" smtClean="0"/>
-              <a:t>Selectively </a:t>
-            </a:r>
-            <a:r>
-              <a:rPr lang="en-US" dirty="0" smtClean="0"/>
-              <a:t>disable the Z-Buffer.</a:t>
+              <a:t>Selectively disable the Z-Buffer.</a:t>
             </a:r>
           </a:p>
           <a:p>
@@ -15657,11 +15579,7 @@
           <a:p>
             <a:r>
               <a:rPr lang="en-US" dirty="0" smtClean="0"/>
-              <a:t>Use compiler optimizations. Duh</a:t>
-            </a:r>
-            <a:r>
-              <a:rPr lang="en-US" dirty="0" smtClean="0"/>
-              <a:t>.</a:t>
+              <a:t>Use compiler optimizations. Duh.</a:t>
             </a:r>
           </a:p>
           <a:p>
@@ -16798,13 +16716,8 @@
           <a:p>
             <a:r>
               <a:rPr lang="en-US" dirty="0" smtClean="0"/>
-              <a:t>Lots of demos and intros are released during this </a:t>
-            </a:r>
-            <a:r>
-              <a:rPr lang="en-US" dirty="0" smtClean="0"/>
-              <a:t>timeframe.</a:t>
-            </a:r>
-            <a:endParaRPr lang="en-US" dirty="0" smtClean="0"/>
+              <a:t>Lots of demos and intros are released during this timeframe.</a:t>
+            </a:r>
           </a:p>
           <a:p>
             <a:endParaRPr lang="en-US" dirty="0" smtClean="0"/>
@@ -16915,11 +16828,7 @@
           <a:p>
             <a:r>
               <a:rPr lang="en-US" dirty="0" smtClean="0"/>
-              <a:t>2002 </a:t>
-            </a:r>
-            <a:r>
-              <a:rPr lang="en-US" dirty="0" smtClean="0"/>
-              <a:t>– N64 is discontinued</a:t>
+              <a:t>2002 – N64 is discontinued</a:t>
             </a:r>
           </a:p>
           <a:p>
@@ -17031,24 +16940,14 @@
           <a:p>
             <a:r>
               <a:rPr lang="en-US" dirty="0" smtClean="0"/>
-              <a:t>Collectors get ahold of the original disks and </a:t>
-            </a:r>
-            <a:r>
-              <a:rPr lang="en-US" dirty="0" smtClean="0"/>
-              <a:t>hardware</a:t>
-            </a:r>
-            <a:endParaRPr lang="en-US" dirty="0" smtClean="0"/>
-          </a:p>
-          <a:p>
-            <a:r>
-              <a:rPr lang="en-US" dirty="0" smtClean="0"/>
-              <a:t>2008 – Alt_libn64 </a:t>
-            </a:r>
-            <a:r>
-              <a:rPr lang="en-US" dirty="0" smtClean="0"/>
-              <a:t>is released</a:t>
-            </a:r>
-            <a:endParaRPr lang="en-US" dirty="0" smtClean="0"/>
+              <a:t>Collectors get ahold of the original disks and hardware</a:t>
+            </a:r>
+          </a:p>
+          <a:p>
+            <a:r>
+              <a:rPr lang="en-US" dirty="0" smtClean="0"/>
+              <a:t>2008 – Alt_libn64 is released</a:t>
+            </a:r>
           </a:p>
           <a:p>
             <a:r>
@@ -17063,16 +16962,11 @@
               <a:rPr lang="en-US" dirty="0" smtClean="0"/>
               <a:t> merges with alt_libn64</a:t>
             </a:r>
-            <a:endParaRPr lang="en-US" dirty="0" smtClean="0"/>
-          </a:p>
-          <a:p>
-            <a:r>
-              <a:rPr lang="en-US" dirty="0" smtClean="0"/>
-              <a:t>2016 – </a:t>
-            </a:r>
-            <a:r>
-              <a:rPr lang="en-US" dirty="0" smtClean="0"/>
-              <a:t>N64Brew is created</a:t>
+          </a:p>
+          <a:p>
+            <a:r>
+              <a:rPr lang="en-US" dirty="0" smtClean="0"/>
+              <a:t>2016 – N64Brew is created</a:t>
             </a:r>
           </a:p>
           <a:p>
@@ -17080,7 +16974,6 @@
               <a:rPr lang="en-US" dirty="0" smtClean="0"/>
               <a:t>2018 – Pyoro64</a:t>
             </a:r>
-            <a:endParaRPr lang="en-US" dirty="0" smtClean="0"/>
           </a:p>
           <a:p>
             <a:r>
@@ -17093,13 +16986,8 @@
             </a:r>
             <a:r>
               <a:rPr lang="en-US" dirty="0" smtClean="0"/>
-              <a:t>SM64 RE project </a:t>
-            </a:r>
-            <a:r>
-              <a:rPr lang="en-US" dirty="0" smtClean="0"/>
-              <a:t>goes public</a:t>
-            </a:r>
-            <a:endParaRPr lang="en-US" dirty="0" smtClean="0"/>
+              <a:t>SM64 RE project goes public</a:t>
+            </a:r>
           </a:p>
           <a:p>
             <a:r>
@@ -17322,11 +17210,7 @@
           <a:p>
             <a:r>
               <a:rPr lang="en-US" dirty="0" smtClean="0"/>
-              <a:t>Discord64</a:t>
-            </a:r>
-            <a:r>
-              <a:rPr lang="en-US" dirty="0" smtClean="0"/>
-              <a:t>, </a:t>
+              <a:t>Discord64, </a:t>
             </a:r>
             <a:r>
               <a:rPr lang="en-US" dirty="0" err="1" smtClean="0"/>
@@ -17994,7 +17878,6 @@
               <a:rPr lang="en-US" dirty="0" smtClean="0"/>
               <a:t> </a:t>
             </a:r>
-            <a:endParaRPr lang="en-US" dirty="0" smtClean="0"/>
           </a:p>
           <a:p>
             <a:r>
@@ -23783,35 +23666,6 @@
           </p:txBody>
         </p:sp>
       </p:grpSp>
-      <p:sp>
-        <p:nvSpPr>
-          <p:cNvPr id="4" name="Retângulo 3"/>
-          <p:cNvSpPr/>
-          <p:nvPr/>
-        </p:nvSpPr>
-        <p:spPr>
-          <a:xfrm>
-            <a:off x="3978728" y="3244334"/>
-            <a:ext cx="1186543" cy="369332"/>
-          </a:xfrm>
-          <a:prstGeom prst="rect">
-            <a:avLst/>
-          </a:prstGeom>
-        </p:spPr>
-        <p:txBody>
-          <a:bodyPr wrap="none">
-            <a:spAutoFit/>
-          </a:bodyPr>
-          <a:lstStyle/>
-          <a:p>
-            <a:r>
-              <a:rPr lang="pt-PT" dirty="0"/>
-              <a:t>melanoma</a:t>
-            </a:r>
-            <a:endParaRPr lang="en-US" dirty="0"/>
-          </a:p>
-        </p:txBody>
-      </p:sp>
     </p:spTree>
     <p:extLst>
       <p:ext uri="{BB962C8B-B14F-4D97-AF65-F5344CB8AC3E}">
@@ -23900,13 +23754,8 @@
             </a:r>
             <a:r>
               <a:rPr lang="en-US" dirty="0" smtClean="0"/>
-              <a:t>VR4300 </a:t>
-            </a:r>
-            <a:r>
-              <a:rPr lang="en-US" dirty="0" smtClean="0"/>
-              <a:t>(MIPS R4300i)</a:t>
-            </a:r>
-            <a:endParaRPr lang="en-US" dirty="0" smtClean="0"/>
+              <a:t>VR4300 (MIPS R4300i)</a:t>
+            </a:r>
           </a:p>
           <a:p>
             <a:pPr lvl="1">
@@ -24270,11 +24119,7 @@
             </a:pPr>
             <a:r>
               <a:rPr lang="en-US" dirty="0" smtClean="0"/>
-              <a:t>Unified Memory </a:t>
-            </a:r>
-            <a:r>
-              <a:rPr lang="en-US" dirty="0" smtClean="0"/>
-              <a:t>Architecture</a:t>
+              <a:t>Unified Memory Architecture</a:t>
             </a:r>
           </a:p>
           <a:p>
@@ -24286,7 +24131,6 @@
               <a:rPr lang="en-US" dirty="0" smtClean="0"/>
               <a:t>Can be expanded to 8MB with an Expansion Pak</a:t>
             </a:r>
-            <a:endParaRPr lang="en-US" dirty="0" smtClean="0"/>
           </a:p>
           <a:p>
             <a:pPr lvl="2">
@@ -24632,15 +24476,7 @@
             </a:pPr>
             <a:r>
               <a:rPr lang="en-US" dirty="0" smtClean="0"/>
-              <a:t>Split into </a:t>
-            </a:r>
-            <a:r>
-              <a:rPr lang="en-US" dirty="0" smtClean="0"/>
-              <a:t>three </a:t>
-            </a:r>
-            <a:r>
-              <a:rPr lang="en-US" dirty="0" smtClean="0"/>
-              <a:t>parts:</a:t>
+              <a:t>Split into three parts:</a:t>
             </a:r>
             <a:endParaRPr lang="en-US" dirty="0"/>
           </a:p>
@@ -24665,11 +24501,7 @@
             </a:pPr>
             <a:r>
               <a:rPr lang="en-US" dirty="0" smtClean="0"/>
-              <a:t>Reality Signal </a:t>
-            </a:r>
-            <a:r>
-              <a:rPr lang="en-US" dirty="0" smtClean="0"/>
-              <a:t>Processor</a:t>
+              <a:t>Reality Signal Processor</a:t>
             </a:r>
           </a:p>
           <a:p>
@@ -24681,7 +24513,6 @@
               <a:rPr lang="en-US" dirty="0" smtClean="0"/>
               <a:t>IO Interfaces</a:t>
             </a:r>
-            <a:endParaRPr lang="en-US" dirty="0" smtClean="0"/>
           </a:p>
         </p:txBody>
       </p:sp>

</xml_diff>